<commit_message>
reprise du code de Camille + mise sous forme de module 'generator.py', décomposition en fonctions et réécriture stricte + création d'un contexte de test
</commit_message>
<xml_diff>
--- a/test/test_output.pptx
+++ b/test/test_output.pptx
@@ -8,11 +8,11 @@
     <p:notesMasterId r:id="rId2"/>
   </p:notesMasterIdLst>
   <p:sldIdLst>
-    <p:sldId id="256" r:id="rId7"/>
-    <p:sldId id="257" r:id="rId8"/>
-    <p:sldId id="258" r:id="rId9"/>
-    <p:sldId id="259" r:id="rId10"/>
-    <p:sldId id="260" r:id="rId11"/>
+    <p:sldId r:id="rId7" id="256"/>
+    <p:sldId r:id="rId8" id="257"/>
+    <p:sldId r:id="rId9" id="258"/>
+    <p:sldId r:id="rId10" id="259"/>
+    <p:sldId r:id="rId11" id="260"/>
   </p:sldIdLst>
   <p:sldSz cx="13004800" cy="9753600"/>
   <p:notesSz cx="6858000" cy="9144000"/>
@@ -5888,7 +5888,7 @@
           <a:lstStyle/>
           <a:p>
             <a:r>
-              <a:t>Test presentation</a:t>
+              <a:t>            Test presentation        </a:t>
             </a:r>
           </a:p>
         </p:txBody>
@@ -5927,7 +5927,7 @@
           <a:lstStyle/>
           <a:p>
             <a:r>
-              <a:t>Hello world</a:t>
+              <a:t>            Hello world        </a:t>
             </a:r>
           </a:p>
         </p:txBody>
@@ -5948,7 +5948,7 @@
           <a:lstStyle/>
           <a:p>
             <a:r>
-              <a:t>departement project</a:t>
+              <a:t>            departement project        </a:t>
             </a:r>
           </a:p>
         </p:txBody>
@@ -5987,7 +5987,7 @@
           <a:lstStyle/>
           <a:p>
             <a:r>
-              <a:t>with normal text</a:t>
+              <a:t>            with normal text        </a:t>
             </a:r>
           </a:p>
         </p:txBody>
@@ -6015,7 +6015,7 @@
           <a:lstStyle/>
           <a:p>
             <a:r>
-              <a:t>my paragraph with one message and less than 140 characters</a:t>
+              <a:t>            my paragraph with one message and less than 140 characters        </a:t>
             </a:r>
           </a:p>
         </p:txBody>
@@ -6054,7 +6054,7 @@
           <a:lstStyle/>
           <a:p>
             <a:r>
-              <a:t>with bullet points</a:t>
+              <a:t>            with bullet points        </a:t>
             </a:r>
           </a:p>
         </p:txBody>
@@ -6075,19 +6075,19 @@
           <a:lstStyle/>
           <a:p>
             <a:r>
-              <a:t>first bullet point</a:t>
+              <a:t>            first bullet point        </a:t>
             </a:r>
           </a:p>
           <a:p>
             <a:pPr/>
             <a:r>
-              <a:t>second bullet point</a:t>
+              <a:t>            second bullet point        </a:t>
             </a:r>
           </a:p>
           <a:p>
             <a:pPr lvl="1"/>
             <a:r>
-              <a:t>third bullet point</a:t>
+              <a:t>            third bullet point        </a:t>
             </a:r>
           </a:p>
         </p:txBody>
@@ -6126,7 +6126,7 @@
           <a:lstStyle/>
           <a:p>
             <a:r>
-              <a:t>with text and image</a:t>
+              <a:t>            with text and image        </a:t>
             </a:r>
           </a:p>
         </p:txBody>
@@ -6154,7 +6154,7 @@
           <a:lstStyle/>
           <a:p>
             <a:r>
-              <a:t>jolie image</a:t>
+              <a:t>            jolie image        </a:t>
             </a:r>
           </a:p>
         </p:txBody>

</xml_diff>